<commit_message>
Updated content for Session 3.
</commit_message>
<xml_diff>
--- a/slides/session02.pptx
+++ b/slides/session02.pptx
@@ -1248,7 +1248,7 @@
         <p:nvSpPr>
           <p:cNvPr id="34819" name="Rectangle 2"/>
           <p:cNvSpPr>
-            <a:spLocks noRot="1" noChangeArrowheads="1" noTextEdit="1"/>
+            <a:spLocks noGrp="1" noRot="1" noChangeAspect="1" noChangeArrowheads="1" noTextEdit="1"/>
           </p:cNvSpPr>
           <p:nvPr>
             <p:ph type="sldImg"/>
@@ -2670,14 +2670,44 @@
           <a:p>
             <a:pPr eaLnBrk="1" hangingPunct="1"/>
             <a:r>
-              <a:rPr lang="en-US" sz="3600" dirty="0" smtClean="0">
+              <a:rPr lang="en-US" sz="3600" smtClean="0">
                 <a:solidFill>
                   <a:schemeClr val="bg1"/>
                 </a:solidFill>
                 <a:latin typeface="Gill Sans"/>
                 <a:cs typeface="Gill Sans"/>
               </a:rPr>
-              <a:t>Session 1I: HTML and CSS</a:t>
+              <a:t>Session </a:t>
+            </a:r>
+            <a:r>
+              <a:rPr lang="en-US" sz="3600">
+                <a:solidFill>
+                  <a:schemeClr val="bg1"/>
+                </a:solidFill>
+                <a:latin typeface="Gill Sans"/>
+                <a:cs typeface="Gill Sans"/>
+              </a:rPr>
+              <a:t>2</a:t>
+            </a:r>
+            <a:r>
+              <a:rPr lang="en-US" sz="3600" smtClean="0">
+                <a:solidFill>
+                  <a:schemeClr val="bg1"/>
+                </a:solidFill>
+                <a:latin typeface="Gill Sans"/>
+                <a:cs typeface="Gill Sans"/>
+              </a:rPr>
+              <a:t>: </a:t>
+            </a:r>
+            <a:r>
+              <a:rPr lang="en-US" sz="3600" dirty="0" smtClean="0">
+                <a:solidFill>
+                  <a:schemeClr val="bg1"/>
+                </a:solidFill>
+                <a:latin typeface="Gill Sans"/>
+                <a:cs typeface="Gill Sans"/>
+              </a:rPr>
+              <a:t>HTML and CSS</a:t>
             </a:r>
             <a:br>
               <a:rPr lang="en-US" sz="3600" dirty="0" smtClean="0">
@@ -7313,11 +7343,11 @@
   <p:clrMapOvr>
     <a:masterClrMapping/>
   </p:clrMapOvr>
-  <mc:AlternateContent xmlns:mc="http://schemas.openxmlformats.org/markup-compatibility/2006">
-    <mc:Choice xmlns:p14="http://schemas.microsoft.com/office/powerpoint/2010/main" Requires="p14">
+  <mc:AlternateContent xmlns:mc="http://schemas.openxmlformats.org/markup-compatibility/2006" xmlns:p14="http://schemas.microsoft.com/office/powerpoint/2010/main">
+    <mc:Choice Requires="p14">
       <p:transition p14:dur="0"/>
     </mc:Choice>
-    <mc:Fallback>
+    <mc:Fallback xmlns="">
       <p:transition xmlns:p14="http://schemas.microsoft.com/office/powerpoint/2010/main"/>
     </mc:Fallback>
   </mc:AlternateContent>
@@ -12354,15 +12384,7 @@
                   <a:srgbClr val="000000"/>
                 </a:solidFill>
               </a:rPr>
-              <a:t>Source: </a:t>
-            </a:r>
-            <a:r>
-              <a:rPr lang="en-US" sz="1000" b="0" dirty="0">
-                <a:solidFill>
-                  <a:srgbClr val="000000"/>
-                </a:solidFill>
-              </a:rPr>
-              <a:t>http://</a:t>
+              <a:t>Source: http://</a:t>
             </a:r>
             <a:r>
               <a:rPr lang="en-US" sz="1000" b="0" dirty="0" err="1">
@@ -12380,11 +12402,6 @@
               </a:rPr>
               <a:t>/computing/96827-the-secret-world-of-submarine-cables</a:t>
             </a:r>
-            <a:endParaRPr lang="en-US" sz="1000" b="0" dirty="0">
-              <a:solidFill>
-                <a:srgbClr val="000000"/>
-              </a:solidFill>
-            </a:endParaRPr>
           </a:p>
         </p:txBody>
       </p:sp>
@@ -12606,13 +12623,8 @@
             <a:pPr lvl="1"/>
             <a:r>
               <a:rPr lang="en-US" dirty="0"/>
-              <a:t>Example: go in your browser and type </a:t>
-            </a:r>
-            <a:r>
-              <a:rPr lang="en-US" dirty="0"/>
-              <a:t>“http://74.125.131.147/”</a:t>
-            </a:r>
-            <a:endParaRPr lang="en-US" dirty="0"/>
+              <a:t>Example: go in your browser and type “http://74.125.131.147/”</a:t>
+            </a:r>
           </a:p>
           <a:p>
             <a:endParaRPr lang="en-US" dirty="0"/>
@@ -14631,11 +14643,7 @@
             <a:pPr lvl="1"/>
             <a:r>
               <a:rPr lang="en-US" dirty="0" smtClean="0"/>
-              <a:t>DNS provides </a:t>
-            </a:r>
-            <a:r>
-              <a:rPr lang="en-US" dirty="0" smtClean="0"/>
-              <a:t>a lookup service</a:t>
+              <a:t>DNS provides a lookup service</a:t>
             </a:r>
             <a:endParaRPr lang="en-US" dirty="0"/>
           </a:p>
@@ -26422,15 +26430,7 @@
                   <a:srgbClr val="000000"/>
                 </a:solidFill>
               </a:rPr>
-              <a:t>Wikipedia </a:t>
-            </a:r>
-            <a:r>
-              <a:rPr lang="en-US" sz="1000" b="0" dirty="0" smtClean="0">
-                <a:solidFill>
-                  <a:srgbClr val="000000"/>
-                </a:solidFill>
-              </a:rPr>
-              <a:t>(Moore’s Law)</a:t>
+              <a:t>Wikipedia (Moore’s Law)</a:t>
             </a:r>
             <a:endParaRPr lang="en-US" sz="1000" b="0" dirty="0">
               <a:solidFill>
@@ -27056,15 +27056,7 @@
                   <a:srgbClr val="000000"/>
                 </a:solidFill>
               </a:rPr>
-              <a:t>Wikipedia </a:t>
-            </a:r>
-            <a:r>
-              <a:rPr lang="en-US" sz="1000" b="0" dirty="0" smtClean="0">
-                <a:solidFill>
-                  <a:srgbClr val="000000"/>
-                </a:solidFill>
-              </a:rPr>
-              <a:t>(Moore’s Law)</a:t>
+              <a:t>Wikipedia (Moore’s Law)</a:t>
             </a:r>
             <a:endParaRPr lang="en-US" sz="1000" b="0" dirty="0">
               <a:solidFill>

</xml_diff>

<commit_message>
Tweaked session 2 slides.
</commit_message>
<xml_diff>
--- a/slides/session02.pptx
+++ b/slides/session02.pptx
@@ -5171,7 +5171,15 @@
             </a:r>
             <a:r>
               <a:rPr lang="en-US" dirty="0"/>
-              <a:t> move data you’re going to use from slow memory into fast memory</a:t>
+              <a:t> move data </a:t>
+            </a:r>
+            <a:r>
+              <a:rPr lang="en-US" dirty="0" smtClean="0"/>
+              <a:t>you’re </a:t>
+            </a:r>
+            <a:r>
+              <a:rPr lang="en-US" dirty="0"/>
+              <a:t>going to use from slow memory into fast memory</a:t>
             </a:r>
           </a:p>
           <a:p>
@@ -16332,7 +16340,7 @@
               <a:t>From the moment you click on </a:t>
             </a:r>
             <a:r>
-              <a:rPr lang="ja-JP" altLang="en-US" dirty="0" smtClean="0"/>
+              <a:rPr lang="en-US" altLang="ja-JP" dirty="0" smtClean="0"/>
               <a:t>“</a:t>
             </a:r>
             <a:r>
@@ -16340,12 +16348,16 @@
               <a:t>check messages</a:t>
             </a:r>
             <a:r>
-              <a:rPr lang="ja-JP" altLang="en-US" dirty="0" smtClean="0"/>
+              <a:rPr lang="en-US" altLang="ja-JP" dirty="0" smtClean="0"/>
               <a:t>”</a:t>
             </a:r>
             <a:r>
               <a:rPr lang="en-US" dirty="0" smtClean="0"/>
-              <a:t> to the moment you start reading your email</a:t>
+              <a:t> </a:t>
+            </a:r>
+            <a:r>
+              <a:rPr lang="en-US" dirty="0" smtClean="0"/>
+              <a:t>to the moment you start reading your email</a:t>
             </a:r>
           </a:p>
           <a:p>
@@ -16354,7 +16366,7 @@
               <a:t>From the moment you click </a:t>
             </a:r>
             <a:r>
-              <a:rPr lang="ja-JP" altLang="en-US" dirty="0" smtClean="0"/>
+              <a:rPr lang="en-US" altLang="ja-JP" dirty="0" smtClean="0"/>
               <a:t>“</a:t>
             </a:r>
             <a:r>
@@ -16362,12 +16374,16 @@
               <a:t>send</a:t>
             </a:r>
             <a:r>
-              <a:rPr lang="ja-JP" altLang="en-US" dirty="0" smtClean="0"/>
+              <a:rPr lang="en-US" altLang="ja-JP" dirty="0" smtClean="0"/>
               <a:t>”</a:t>
             </a:r>
             <a:r>
               <a:rPr lang="en-US" dirty="0" smtClean="0"/>
-              <a:t> to the moment the other party receives the email</a:t>
+              <a:t> </a:t>
+            </a:r>
+            <a:r>
+              <a:rPr lang="en-US" dirty="0" smtClean="0"/>
+              <a:t>to the moment the other party receives the email</a:t>
             </a:r>
           </a:p>
           <a:p>
@@ -16376,7 +16392,7 @@
               <a:t>From the moment you type a URL and hit </a:t>
             </a:r>
             <a:r>
-              <a:rPr lang="ja-JP" altLang="en-US" dirty="0" smtClean="0"/>
+              <a:rPr lang="en-US" altLang="ja-JP" dirty="0" smtClean="0"/>
               <a:t>“</a:t>
             </a:r>
             <a:r>
@@ -16384,12 +16400,16 @@
               <a:t>enter</a:t>
             </a:r>
             <a:r>
-              <a:rPr lang="ja-JP" altLang="en-US" dirty="0" smtClean="0"/>
+              <a:rPr lang="en-US" altLang="ja-JP" dirty="0" smtClean="0"/>
               <a:t>”</a:t>
             </a:r>
             <a:r>
               <a:rPr lang="en-US" dirty="0" smtClean="0"/>
-              <a:t> to the moment you see the Web page</a:t>
+              <a:t> </a:t>
+            </a:r>
+            <a:r>
+              <a:rPr lang="en-US" dirty="0" smtClean="0"/>
+              <a:t>to the moment you see the Web page</a:t>
             </a:r>
           </a:p>
           <a:p>
@@ -23391,18 +23411,22 @@
           <a:lstStyle/>
           <a:p>
             <a:r>
-              <a:rPr lang="en-US" smtClean="0"/>
+              <a:rPr lang="en-US" dirty="0" smtClean="0"/>
               <a:t>What</a:t>
             </a:r>
             <a:r>
-              <a:rPr lang="ja-JP" altLang="en-US" smtClean="0"/>
+              <a:rPr lang="en-US" altLang="ja-JP" dirty="0" smtClean="0"/>
               <a:t>’</a:t>
             </a:r>
             <a:r>
-              <a:rPr lang="en-US" smtClean="0"/>
-              <a:t>s a Document?</a:t>
-            </a:r>
-            <a:endParaRPr lang="en-US"/>
+              <a:rPr lang="en-US" dirty="0" smtClean="0"/>
+              <a:t>s </a:t>
+            </a:r>
+            <a:r>
+              <a:rPr lang="en-US" dirty="0" smtClean="0"/>
+              <a:t>a Document?</a:t>
+            </a:r>
+            <a:endParaRPr lang="en-US" dirty="0"/>
           </a:p>
         </p:txBody>
       </p:sp>
@@ -23523,60 +23547,64 @@
           <a:lstStyle/>
           <a:p>
             <a:r>
-              <a:rPr lang="en-US" smtClean="0"/>
+              <a:rPr lang="en-US" dirty="0" smtClean="0"/>
               <a:t>Separating content and structure from appearance</a:t>
             </a:r>
           </a:p>
           <a:p>
             <a:r>
-              <a:rPr lang="en-US" smtClean="0"/>
+              <a:rPr lang="en-US" dirty="0" smtClean="0"/>
               <a:t>Rules for defining styles </a:t>
             </a:r>
             <a:r>
-              <a:rPr lang="ja-JP" altLang="en-US" smtClean="0"/>
+              <a:rPr lang="en-US" altLang="ja-JP" dirty="0" smtClean="0"/>
               <a:t>“</a:t>
             </a:r>
             <a:r>
-              <a:rPr lang="en-US" smtClean="0"/>
+              <a:rPr lang="en-US" dirty="0" smtClean="0"/>
               <a:t>cascade</a:t>
             </a:r>
             <a:r>
-              <a:rPr lang="ja-JP" altLang="en-US" smtClean="0"/>
+              <a:rPr lang="en-US" altLang="ja-JP" dirty="0" smtClean="0"/>
               <a:t>”</a:t>
             </a:r>
             <a:r>
-              <a:rPr lang="en-US" smtClean="0"/>
-              <a:t> from broad to narrow:</a:t>
+              <a:rPr lang="en-US" dirty="0" smtClean="0"/>
+              <a:t> </a:t>
+            </a:r>
+            <a:r>
+              <a:rPr lang="en-US" dirty="0" smtClean="0"/>
+              <a:t>from broad to narrow:</a:t>
             </a:r>
           </a:p>
           <a:p>
             <a:pPr lvl="1"/>
             <a:r>
-              <a:rPr lang="en-US" smtClean="0"/>
+              <a:rPr lang="en-US" dirty="0" smtClean="0"/>
               <a:t>Browser default</a:t>
             </a:r>
           </a:p>
           <a:p>
             <a:pPr lvl="1"/>
             <a:r>
-              <a:rPr lang="en-US" smtClean="0"/>
+              <a:rPr lang="en-US" dirty="0" smtClean="0"/>
               <a:t>External style sheet</a:t>
             </a:r>
           </a:p>
           <a:p>
             <a:pPr lvl="1"/>
             <a:r>
-              <a:rPr lang="en-US" smtClean="0"/>
+              <a:rPr lang="en-US" dirty="0" smtClean="0"/>
               <a:t>Internal style sheet</a:t>
             </a:r>
           </a:p>
           <a:p>
             <a:pPr lvl="1"/>
             <a:r>
-              <a:rPr lang="en-US" smtClean="0"/>
+              <a:rPr lang="en-US" dirty="0" smtClean="0"/>
               <a:t>Inline style</a:t>
             </a:r>
-            <a:endParaRPr lang="en-US"/>
+            <a:endParaRPr lang="en-US" dirty="0"/>
           </a:p>
         </p:txBody>
       </p:sp>

</xml_diff>